<commit_message>
interpretability 2 slide udpates
</commit_message>
<xml_diff>
--- a/11 - Model Interpretability Pt 2/Interpretability part 2.pptx
+++ b/11 - Model Interpretability Pt 2/Interpretability part 2.pptx
@@ -281,8 +281,11 @@
     </a:lvl9pPr>
   </p:defaultTextStyle>
   <p:extLst>
+    <p:ext uri="{EFAFB233-063F-42B5-8137-9DF3F51BA10A}">
+      <p15:sldGuideLst xmlns:p15="http://schemas.microsoft.com/office/powerpoint/2012/main"/>
+    </p:ext>
     <p:ext uri="http://customooxmlschemas.google.com/">
-      <go:slidesCustomData xmlns:go="http://customooxmlschemas.google.com/" xmlns:p15="http://schemas.microsoft.com/office/powerpoint/2012/main" xmlns:p14="http://schemas.microsoft.com/office/powerpoint/2010/main" xmlns:com="http://schemas.openxmlformats.org/drawingml/2006/compatibility" xmlns:pvml="urn:schemas-microsoft-com:office:powerpoint" xmlns:v="urn:schemas-microsoft-com:vml" xmlns:o="urn:schemas-microsoft-com:office:office" xmlns:dgm="http://schemas.openxmlformats.org/drawingml/2006/diagram" xmlns:c="http://schemas.openxmlformats.org/drawingml/2006/chart" xmlns:mv="urn:schemas-microsoft-com:mac:vml" xmlns:mc="http://schemas.openxmlformats.org/markup-compatibility/2006" xmlns="" r:id="rId43" roundtripDataSignature="AMtx7miaBNfqHTds3AtKFboosNv4pOAy4g=="/>
+      <go:slidesCustomData xmlns="" xmlns:mc="http://schemas.openxmlformats.org/markup-compatibility/2006" xmlns:mv="urn:schemas-microsoft-com:mac:vml" xmlns:c="http://schemas.openxmlformats.org/drawingml/2006/chart" xmlns:dgm="http://schemas.openxmlformats.org/drawingml/2006/diagram" xmlns:o="urn:schemas-microsoft-com:office:office" xmlns:v="urn:schemas-microsoft-com:vml" xmlns:pvml="urn:schemas-microsoft-com:office:powerpoint" xmlns:com="http://schemas.openxmlformats.org/drawingml/2006/compatibility" xmlns:p14="http://schemas.microsoft.com/office/powerpoint/2010/main" xmlns:p15="http://schemas.microsoft.com/office/powerpoint/2012/main" xmlns:go="http://customooxmlschemas.google.com/" r:id="rId43" roundtripDataSignature="AMtx7miaBNfqHTds3AtKFboosNv4pOAy4g=="/>
     </p:ext>
   </p:extLst>
 </p:presentation>
@@ -16314,7 +16317,7 @@
 </file>
 
 <file path=ppt/slides/slide10.xml><?xml version="1.0" encoding="utf-8"?>
-<p:sld xmlns:a="http://schemas.openxmlformats.org/drawingml/2006/main" xmlns:r="http://schemas.openxmlformats.org/officeDocument/2006/relationships" xmlns:p="http://schemas.openxmlformats.org/presentationml/2006/main">
+<p:sld xmlns:a="http://schemas.openxmlformats.org/drawingml/2006/main" xmlns:r="http://schemas.openxmlformats.org/officeDocument/2006/relationships" xmlns:p="http://schemas.openxmlformats.org/presentationml/2006/main" show="0">
   <p:cSld>
     <p:spTree>
       <p:nvGrpSpPr>
@@ -16366,7 +16369,7 @@
 </file>
 
 <file path=ppt/slides/slide11.xml><?xml version="1.0" encoding="utf-8"?>
-<p:sld xmlns:a="http://schemas.openxmlformats.org/drawingml/2006/main" xmlns:r="http://schemas.openxmlformats.org/officeDocument/2006/relationships" xmlns:p="http://schemas.openxmlformats.org/presentationml/2006/main">
+<p:sld xmlns:a="http://schemas.openxmlformats.org/drawingml/2006/main" xmlns:r="http://schemas.openxmlformats.org/officeDocument/2006/relationships" xmlns:p="http://schemas.openxmlformats.org/presentationml/2006/main" show="0">
   <p:cSld>
     <p:spTree>
       <p:nvGrpSpPr>
@@ -16568,7 +16571,7 @@
 </file>
 
 <file path=ppt/slides/slide13.xml><?xml version="1.0" encoding="utf-8"?>
-<p:sld xmlns:a="http://schemas.openxmlformats.org/drawingml/2006/main" xmlns:r="http://schemas.openxmlformats.org/officeDocument/2006/relationships" xmlns:p="http://schemas.openxmlformats.org/presentationml/2006/main">
+<p:sld xmlns:a="http://schemas.openxmlformats.org/drawingml/2006/main" xmlns:r="http://schemas.openxmlformats.org/officeDocument/2006/relationships" xmlns:p="http://schemas.openxmlformats.org/presentationml/2006/main" show="0">
   <p:cSld>
     <p:spTree>
       <p:nvGrpSpPr>
@@ -20030,7 +20033,25 @@
               </a:rPr>
               <a:t>update assignment</a:t>
             </a:r>
-            <a:endParaRPr lang="en-US" dirty="0"/>
+            <a:r>
+              <a:rPr lang="en-US" dirty="0"/>
+              <a:t> </a:t>
+            </a:r>
+            <a:br>
+              <a:rPr lang="en-US" dirty="0"/>
+            </a:br>
+            <a:r>
+              <a:rPr lang="en-US" dirty="0"/>
+              <a:t>(model selection, feature </a:t>
+            </a:r>
+            <a:r>
+              <a:rPr lang="en-US" dirty="0" err="1"/>
+              <a:t>importances</a:t>
+            </a:r>
+            <a:r>
+              <a:rPr lang="en-US" dirty="0"/>
+              <a:t>, crosstabs)</a:t>
+            </a:r>
           </a:p>
           <a:p>
             <a:r>
@@ -21830,7 +21851,21 @@
               </a:rPr>
               <a:t>update assignment</a:t>
             </a:r>
-            <a:endParaRPr lang="en-US" dirty="0"/>
+            <a:br>
+              <a:rPr lang="en-US" dirty="0"/>
+            </a:br>
+            <a:r>
+              <a:rPr lang="en-US" dirty="0"/>
+              <a:t>(model selection, feature </a:t>
+            </a:r>
+            <a:r>
+              <a:rPr lang="en-US" dirty="0" err="1"/>
+              <a:t>importances</a:t>
+            </a:r>
+            <a:r>
+              <a:rPr lang="en-US" dirty="0"/>
+              <a:t>, crosstabs)</a:t>
+            </a:r>
           </a:p>
           <a:p>
             <a:r>
@@ -23037,13 +23072,13 @@
               <a:buChar char="●"/>
             </a:pPr>
             <a:r>
-              <a:rPr lang="en-US"/>
+              <a:rPr lang="en-US" dirty="0"/>
               <a:t>Globally Interpretable Models</a:t>
             </a:r>
             <a:br>
-              <a:rPr lang="en-US"/>
+              <a:rPr lang="en-US" dirty="0"/>
             </a:br>
-            <a:endParaRPr/>
+            <a:endParaRPr dirty="0"/>
           </a:p>
           <a:p>
             <a:pPr marL="914400" lvl="1" indent="-349250" algn="l" rtl="0">
@@ -23060,13 +23095,13 @@
               <a:buChar char="○"/>
             </a:pPr>
             <a:r>
-              <a:rPr lang="en-US"/>
+              <a:rPr lang="en-US" dirty="0" err="1"/>
               <a:t>RiskSLIM</a:t>
             </a:r>
             <a:br>
-              <a:rPr lang="en-US"/>
+              <a:rPr lang="en-US" dirty="0"/>
             </a:br>
-            <a:endParaRPr/>
+            <a:endParaRPr dirty="0"/>
           </a:p>
           <a:p>
             <a:pPr marL="914400" lvl="1" indent="-349250" algn="l" rtl="0">
@@ -23083,13 +23118,13 @@
               <a:buChar char="○"/>
             </a:pPr>
             <a:r>
-              <a:rPr lang="en-US"/>
+              <a:rPr lang="en-US" dirty="0"/>
               <a:t>GA²M</a:t>
             </a:r>
             <a:br>
-              <a:rPr lang="en-US"/>
+              <a:rPr lang="en-US" dirty="0"/>
             </a:br>
-            <a:endParaRPr/>
+            <a:endParaRPr dirty="0"/>
           </a:p>
           <a:p>
             <a:pPr marL="457200" lvl="0" indent="-381000" algn="l" rtl="0">
@@ -23106,13 +23141,17 @@
               <a:buChar char="●"/>
             </a:pPr>
             <a:r>
-              <a:rPr lang="en-US"/>
-              <a:t>Methods for Local Explainability</a:t>
+              <a:rPr lang="en-US" dirty="0"/>
+              <a:t>Methods for Local </a:t>
+            </a:r>
+            <a:r>
+              <a:rPr lang="en-US" dirty="0" err="1"/>
+              <a:t>Explainability</a:t>
             </a:r>
             <a:br>
-              <a:rPr lang="en-US"/>
+              <a:rPr lang="en-US" dirty="0"/>
             </a:br>
-            <a:endParaRPr/>
+            <a:endParaRPr dirty="0"/>
           </a:p>
           <a:p>
             <a:pPr marL="914400" lvl="1" indent="-349250" algn="l" rtl="0">
@@ -23129,13 +23168,13 @@
               <a:buChar char="○"/>
             </a:pPr>
             <a:r>
-              <a:rPr lang="en-US"/>
-              <a:t>LIME</a:t>
+              <a:rPr lang="en-US" dirty="0"/>
+              <a:t>SHAP</a:t>
             </a:r>
             <a:br>
-              <a:rPr lang="en-US"/>
+              <a:rPr lang="en-US" dirty="0"/>
             </a:br>
-            <a:endParaRPr/>
+            <a:endParaRPr dirty="0"/>
           </a:p>
           <a:p>
             <a:pPr marL="914400" lvl="1" indent="-349250" algn="l" rtl="0">
@@ -23152,13 +23191,13 @@
               <a:buChar char="○"/>
             </a:pPr>
             <a:r>
-              <a:rPr lang="en-US"/>
-              <a:t>MAPLE</a:t>
+              <a:rPr lang="en-US" dirty="0"/>
+              <a:t>LIME</a:t>
             </a:r>
             <a:br>
-              <a:rPr lang="en-US"/>
+              <a:rPr lang="en-US" dirty="0"/>
             </a:br>
-            <a:endParaRPr/>
+            <a:endParaRPr dirty="0"/>
           </a:p>
           <a:p>
             <a:pPr marL="914400" lvl="1" indent="-349250" algn="l" rtl="0">
@@ -23175,10 +23214,10 @@
               <a:buChar char="○"/>
             </a:pPr>
             <a:r>
-              <a:rPr lang="en-US"/>
-              <a:t>SHAP</a:t>
+              <a:rPr lang="en-US" dirty="0"/>
+              <a:t>MAPLE</a:t>
             </a:r>
-            <a:endParaRPr/>
+            <a:endParaRPr dirty="0"/>
           </a:p>
         </p:txBody>
       </p:sp>
@@ -23397,7 +23436,7 @@
 </file>
 
 <file path=ppt/slides/slide9.xml><?xml version="1.0" encoding="utf-8"?>
-<p:sld xmlns:a="http://schemas.openxmlformats.org/drawingml/2006/main" xmlns:r="http://schemas.openxmlformats.org/officeDocument/2006/relationships" xmlns:p="http://schemas.openxmlformats.org/presentationml/2006/main">
+<p:sld xmlns:a="http://schemas.openxmlformats.org/drawingml/2006/main" xmlns:r="http://schemas.openxmlformats.org/officeDocument/2006/relationships" xmlns:p="http://schemas.openxmlformats.org/presentationml/2006/main" show="0">
   <p:cSld>
     <p:spTree>
       <p:nvGrpSpPr>

</xml_diff>